<commit_message>
getting the inst/extdata to work
</commit_message>
<xml_diff>
--- a/documentation/Eudract Project Stats Leads.pptx
+++ b/documentation/Eudract Project Stats Leads.pptx
@@ -6,7 +6,7 @@
     <p:sldMasterId id="2147483661" r:id="rId2"/>
   </p:sldMasterIdLst>
   <p:notesMasterIdLst>
-    <p:notesMasterId r:id="rId25"/>
+    <p:notesMasterId r:id="rId26"/>
   </p:notesMasterIdLst>
   <p:sldIdLst>
     <p:sldId id="256" r:id="rId3"/>
@@ -23,14 +23,15 @@
     <p:sldId id="288" r:id="rId14"/>
     <p:sldId id="290" r:id="rId15"/>
     <p:sldId id="291" r:id="rId16"/>
-    <p:sldId id="292" r:id="rId17"/>
-    <p:sldId id="293" r:id="rId18"/>
+    <p:sldId id="293" r:id="rId17"/>
+    <p:sldId id="292" r:id="rId18"/>
     <p:sldId id="294" r:id="rId19"/>
     <p:sldId id="295" r:id="rId20"/>
     <p:sldId id="296" r:id="rId21"/>
-    <p:sldId id="297" r:id="rId22"/>
+    <p:sldId id="300" r:id="rId22"/>
     <p:sldId id="298" r:id="rId23"/>
-    <p:sldId id="289" r:id="rId24"/>
+    <p:sldId id="299" r:id="rId24"/>
+    <p:sldId id="289" r:id="rId25"/>
   </p:sldIdLst>
   <p:sldSz cx="9144000" cy="6858000" type="screen4x3"/>
   <p:notesSz cx="6797675" cy="9926638"/>
@@ -129,6 +130,11 @@
       </a:defRPr>
     </a:lvl9pPr>
   </p:defaultTextStyle>
+  <p:extLst>
+    <p:ext uri="{EFAFB233-063F-42B5-8137-9DF3F51BA10A}">
+      <p15:sldGuideLst xmlns:p15="http://schemas.microsoft.com/office/powerpoint/2012/main"/>
+    </p:ext>
+  </p:extLst>
 </p:presentation>
 </file>
 
@@ -5275,7 +5281,7 @@
         </p:spPr>
         <p:txBody>
           <a:bodyPr anchor="ctr">
-            <a:normAutofit fontScale="85000" lnSpcReduction="10000"/>
+            <a:normAutofit fontScale="92500" lnSpcReduction="20000"/>
           </a:bodyPr>
           <a:lstStyle/>
           <a:p>
@@ -5922,14 +5928,14 @@
       </p:grpSpPr>
       <p:sp>
         <p:nvSpPr>
-          <p:cNvPr id="170" name="TextShape 1"/>
+          <p:cNvPr id="172" name="TextShape 1"/>
           <p:cNvSpPr txBox="1"/>
           <p:nvPr/>
         </p:nvSpPr>
         <p:spPr>
           <a:xfrm>
-            <a:off x="71280" y="866160"/>
-            <a:ext cx="8929440" cy="625320"/>
+            <a:off x="71280" y="840266"/>
+            <a:ext cx="8929440" cy="677108"/>
           </a:xfrm>
           <a:prstGeom prst="rect">
             <a:avLst/>
@@ -5946,248 +5952,56 @@
           <a:lstStyle/>
           <a:p>
             <a:r>
-              <a:rPr lang="en-US" sz="4400" b="0" strike="noStrike" spc="-1">
+              <a:rPr lang="en-US" sz="4400" spc="-1" dirty="0" smtClean="0">
                 <a:solidFill>
                   <a:srgbClr val="000000"/>
                 </a:solidFill>
                 <a:latin typeface="Arial"/>
               </a:rPr>
-              <a:t>Unification across R/SAS/Stata</a:t>
-            </a:r>
-          </a:p>
-        </p:txBody>
-      </p:sp>
-      <p:sp>
-        <p:nvSpPr>
-          <p:cNvPr id="171" name="TextShape 2"/>
-          <p:cNvSpPr txBox="1"/>
-          <p:nvPr/>
-        </p:nvSpPr>
-        <p:spPr>
-          <a:xfrm>
-            <a:off x="457200" y="1857240"/>
-            <a:ext cx="8229240" cy="4268520"/>
-          </a:xfrm>
-          <a:prstGeom prst="rect">
-            <a:avLst/>
-          </a:prstGeom>
-          <a:noFill/>
-          <a:ln>
-            <a:noFill/>
-          </a:ln>
-        </p:spPr>
-        <p:txBody>
-          <a:bodyPr lIns="0" tIns="0" rIns="0" bIns="0">
-            <a:normAutofit fontScale="99500" lnSpcReduction="10000"/>
-          </a:bodyPr>
-          <a:lstStyle/>
-          <a:p>
-            <a:pPr marL="432000" indent="-324000">
-              <a:spcBef>
-                <a:spcPts val="1417"/>
-              </a:spcBef>
-              <a:buClr>
-                <a:srgbClr val="000000"/>
-              </a:buClr>
-              <a:buSzPct val="45000"/>
-              <a:buFont typeface="Wingdings" charset="2"/>
-              <a:buChar char=""/>
-            </a:pPr>
-            <a:r>
-              <a:rPr lang="en-US" sz="3200" b="0" i="1" strike="noStrike" spc="-1" dirty="0">
+              <a:t>Final Report from </a:t>
+            </a:r>
+            <a:r>
+              <a:rPr lang="en-US" sz="4400" spc="-1" dirty="0" err="1" smtClean="0">
                 <a:solidFill>
                   <a:srgbClr val="000000"/>
                 </a:solidFill>
-                <a:latin typeface="Calibri"/>
+                <a:latin typeface="Arial"/>
               </a:rPr>
-              <a:t>Could</a:t>
-            </a:r>
-            <a:r>
-              <a:rPr lang="en-US" sz="3200" b="0" strike="noStrike" spc="-1" dirty="0">
-                <a:solidFill>
-                  <a:srgbClr val="000000"/>
-                </a:solidFill>
-                <a:latin typeface="Calibri"/>
-              </a:rPr>
-              <a:t> export directly writing output mixing text and data</a:t>
-            </a:r>
-            <a:endParaRPr lang="en-US" sz="3200" b="0" i="1" strike="noStrike" spc="-1" dirty="0">
-              <a:solidFill>
-                <a:srgbClr val="000000"/>
-              </a:solidFill>
-              <a:latin typeface="Calibri"/>
-            </a:endParaRPr>
-          </a:p>
-          <a:p>
-            <a:pPr marL="864000" lvl="1" indent="-324000">
-              <a:spcBef>
-                <a:spcPts val="1134"/>
-              </a:spcBef>
-              <a:buClr>
-                <a:srgbClr val="000000"/>
-              </a:buClr>
-              <a:buSzPct val="75000"/>
-              <a:buFont typeface="Symbol" charset="2"/>
-              <a:buChar char=""/>
-            </a:pPr>
-            <a:r>
-              <a:rPr lang="en-US" sz="2400" b="0" strike="noStrike" spc="-1" dirty="0">
-                <a:solidFill>
-                  <a:srgbClr val="000000"/>
-                </a:solidFill>
-                <a:latin typeface="Calibri"/>
-              </a:rPr>
-              <a:t> Print (“&lt;blah&gt;”, count[</a:t>
-            </a:r>
-            <a:r>
-              <a:rPr lang="en-US" sz="2400" b="0" strike="noStrike" spc="-1" dirty="0" err="1">
-                <a:solidFill>
-                  <a:srgbClr val="000000"/>
-                </a:solidFill>
-                <a:latin typeface="Calibri"/>
-              </a:rPr>
-              <a:t>i,j</a:t>
-            </a:r>
-            <a:r>
-              <a:rPr lang="en-US" sz="2400" b="0" strike="noStrike" spc="-1" dirty="0">
-                <a:solidFill>
-                  <a:srgbClr val="000000"/>
-                </a:solidFill>
-                <a:latin typeface="Calibri"/>
-              </a:rPr>
-              <a:t>], “&lt;/blah&gt;”)</a:t>
-            </a:r>
-          </a:p>
-          <a:p>
-            <a:pPr marL="432000" indent="-324000">
-              <a:spcBef>
-                <a:spcPts val="1417"/>
-              </a:spcBef>
-              <a:buClr>
-                <a:srgbClr val="000000"/>
-              </a:buClr>
-              <a:buSzPct val="45000"/>
-              <a:buFont typeface="Wingdings" charset="2"/>
-              <a:buChar char=""/>
-            </a:pPr>
-            <a:r>
-              <a:rPr lang="en-US" sz="3200" b="0" i="1" strike="noStrike" spc="-1" dirty="0" smtClean="0">
-                <a:solidFill>
-                  <a:srgbClr val="000000"/>
-                </a:solidFill>
-                <a:latin typeface="Calibri"/>
-              </a:rPr>
-              <a:t>But</a:t>
-            </a:r>
-            <a:r>
-              <a:rPr lang="en-US" sz="3200" b="0" strike="noStrike" spc="-1" dirty="0" smtClean="0">
-                <a:solidFill>
-                  <a:srgbClr val="000000"/>
-                </a:solidFill>
-                <a:latin typeface="Calibri"/>
-              </a:rPr>
-              <a:t>: one </a:t>
-            </a:r>
-            <a:r>
-              <a:rPr lang="en-US" sz="3200" b="0" strike="noStrike" spc="-1" dirty="0">
-                <a:solidFill>
-                  <a:srgbClr val="000000"/>
-                </a:solidFill>
-                <a:latin typeface="Calibri"/>
-              </a:rPr>
-              <a:t>unified XSLT stage for the details</a:t>
-            </a:r>
-          </a:p>
-          <a:p>
-            <a:pPr marL="864000" lvl="1" indent="-324000">
-              <a:spcBef>
-                <a:spcPts val="1134"/>
-              </a:spcBef>
-              <a:buClr>
-                <a:srgbClr val="000000"/>
-              </a:buClr>
-              <a:buSzPct val="75000"/>
-              <a:buFont typeface="Symbol" charset="2"/>
-              <a:buChar char=""/>
-            </a:pPr>
-            <a:r>
-              <a:rPr lang="en-US" sz="2400" b="0" strike="noStrike" spc="-1" dirty="0">
-                <a:solidFill>
-                  <a:srgbClr val="000000"/>
-                </a:solidFill>
-                <a:latin typeface="Calibri"/>
-              </a:rPr>
-              <a:t>Easy to amend for future changes</a:t>
-            </a:r>
-          </a:p>
-          <a:p>
-            <a:pPr marL="864000" lvl="1" indent="-324000">
-              <a:spcBef>
-                <a:spcPts val="1134"/>
-              </a:spcBef>
-              <a:buClr>
-                <a:srgbClr val="000000"/>
-              </a:buClr>
-              <a:buSzPct val="75000"/>
-              <a:buFont typeface="Symbol" charset="2"/>
-              <a:buChar char=""/>
-            </a:pPr>
-            <a:r>
-              <a:rPr lang="en-US" sz="2400" b="0" strike="noStrike" spc="-1" dirty="0">
-                <a:solidFill>
-                  <a:srgbClr val="000000"/>
-                </a:solidFill>
-                <a:latin typeface="Calibri"/>
-              </a:rPr>
-              <a:t>Open-source code on GitHub for anyone to propose amendments</a:t>
-            </a:r>
-          </a:p>
-          <a:p>
-            <a:pPr marL="864000" lvl="1" indent="-324000">
-              <a:spcBef>
-                <a:spcPts val="1134"/>
-              </a:spcBef>
-              <a:buClr>
-                <a:srgbClr val="000000"/>
-              </a:buClr>
-              <a:buSzPct val="75000"/>
-              <a:buFont typeface="Symbol" charset="2"/>
-              <a:buChar char=""/>
-            </a:pPr>
-            <a:r>
-              <a:rPr lang="en-US" sz="2400" b="0" strike="noStrike" spc="-1" dirty="0">
-                <a:solidFill>
-                  <a:srgbClr val="000000"/>
-                </a:solidFill>
-                <a:latin typeface="Calibri"/>
-              </a:rPr>
-              <a:t>Leaves the statisticians to do statistics</a:t>
-            </a:r>
-          </a:p>
-          <a:p>
-            <a:pPr marL="864000" lvl="1" indent="-324000">
-              <a:spcBef>
-                <a:spcPts val="1134"/>
-              </a:spcBef>
-              <a:buClr>
-                <a:srgbClr val="000000"/>
-              </a:buClr>
-              <a:buSzPct val="75000"/>
-              <a:buFont typeface="Symbol" charset="2"/>
-              <a:buChar char=""/>
-            </a:pPr>
-            <a:r>
-              <a:rPr lang="en-US" sz="2400" b="0" strike="noStrike" spc="-1" dirty="0">
-                <a:solidFill>
-                  <a:srgbClr val="000000"/>
-                </a:solidFill>
-                <a:latin typeface="Calibri"/>
-              </a:rPr>
-              <a:t>Need to export into “Simple” XML from Stata</a:t>
-            </a:r>
-          </a:p>
-        </p:txBody>
-      </p:sp>
+              <a:t>EudraCT</a:t>
+            </a:r>
+            <a:endParaRPr lang="en-US" sz="4400" b="0" strike="noStrike" spc="-1" dirty="0">
+              <a:solidFill>
+                <a:srgbClr val="000000"/>
+              </a:solidFill>
+              <a:latin typeface="Arial"/>
+            </a:endParaRPr>
+          </a:p>
+        </p:txBody>
+      </p:sp>
+      <p:pic>
+        <p:nvPicPr>
+          <p:cNvPr id="2" name="Picture 1"/>
+          <p:cNvPicPr>
+            <a:picLocks noChangeAspect="1"/>
+          </p:cNvPicPr>
+          <p:nvPr/>
+        </p:nvPicPr>
+        <p:blipFill>
+          <a:blip r:embed="rId2"/>
+          <a:stretch>
+            <a:fillRect/>
+          </a:stretch>
+        </p:blipFill>
+        <p:spPr>
+          <a:xfrm>
+            <a:off x="1978268" y="1517374"/>
+            <a:ext cx="4321419" cy="5267401"/>
+          </a:xfrm>
+          <a:prstGeom prst="rect">
+            <a:avLst/>
+          </a:prstGeom>
+        </p:spPr>
+      </p:pic>
     </p:spTree>
   </p:cSld>
   <p:clrMapOvr>
@@ -6250,7 +6064,7 @@
       </p:grpSpPr>
       <p:sp>
         <p:nvSpPr>
-          <p:cNvPr id="172" name="TextShape 1"/>
+          <p:cNvPr id="170" name="TextShape 1"/>
           <p:cNvSpPr txBox="1"/>
           <p:nvPr/>
         </p:nvSpPr>
@@ -6280,7 +6094,238 @@
                 </a:solidFill>
                 <a:latin typeface="Arial"/>
               </a:rPr>
-              <a:t>Show off the final result Somehow</a:t>
+              <a:t>Unification across R/SAS/Stata</a:t>
+            </a:r>
+          </a:p>
+        </p:txBody>
+      </p:sp>
+      <p:sp>
+        <p:nvSpPr>
+          <p:cNvPr id="171" name="TextShape 2"/>
+          <p:cNvSpPr txBox="1"/>
+          <p:nvPr/>
+        </p:nvSpPr>
+        <p:spPr>
+          <a:xfrm>
+            <a:off x="457200" y="1857240"/>
+            <a:ext cx="8229240" cy="4268520"/>
+          </a:xfrm>
+          <a:prstGeom prst="rect">
+            <a:avLst/>
+          </a:prstGeom>
+          <a:noFill/>
+          <a:ln>
+            <a:noFill/>
+          </a:ln>
+        </p:spPr>
+        <p:txBody>
+          <a:bodyPr lIns="0" tIns="0" rIns="0" bIns="0">
+            <a:normAutofit fontScale="99500" lnSpcReduction="10000"/>
+          </a:bodyPr>
+          <a:lstStyle/>
+          <a:p>
+            <a:pPr marL="432000" indent="-324000">
+              <a:spcBef>
+                <a:spcPts val="1417"/>
+              </a:spcBef>
+              <a:buClr>
+                <a:srgbClr val="000000"/>
+              </a:buClr>
+              <a:buSzPct val="45000"/>
+              <a:buFont typeface="Wingdings" charset="2"/>
+              <a:buChar char=""/>
+            </a:pPr>
+            <a:r>
+              <a:rPr lang="en-US" sz="3200" b="0" i="1" strike="noStrike" spc="-1" dirty="0">
+                <a:solidFill>
+                  <a:srgbClr val="000000"/>
+                </a:solidFill>
+                <a:latin typeface="Calibri"/>
+              </a:rPr>
+              <a:t>Could</a:t>
+            </a:r>
+            <a:r>
+              <a:rPr lang="en-US" sz="3200" b="0" strike="noStrike" spc="-1" dirty="0">
+                <a:solidFill>
+                  <a:srgbClr val="000000"/>
+                </a:solidFill>
+                <a:latin typeface="Calibri"/>
+              </a:rPr>
+              <a:t> export directly writing output mixing text and data</a:t>
+            </a:r>
+            <a:endParaRPr lang="en-US" sz="3200" b="0" i="1" strike="noStrike" spc="-1" dirty="0">
+              <a:solidFill>
+                <a:srgbClr val="000000"/>
+              </a:solidFill>
+              <a:latin typeface="Calibri"/>
+            </a:endParaRPr>
+          </a:p>
+          <a:p>
+            <a:pPr marL="864000" lvl="1" indent="-324000">
+              <a:spcBef>
+                <a:spcPts val="1134"/>
+              </a:spcBef>
+              <a:buClr>
+                <a:srgbClr val="000000"/>
+              </a:buClr>
+              <a:buSzPct val="75000"/>
+              <a:buFont typeface="Symbol" charset="2"/>
+              <a:buChar char=""/>
+            </a:pPr>
+            <a:r>
+              <a:rPr lang="en-US" sz="2400" b="0" strike="noStrike" spc="-1" dirty="0">
+                <a:solidFill>
+                  <a:srgbClr val="000000"/>
+                </a:solidFill>
+                <a:latin typeface="Calibri"/>
+              </a:rPr>
+              <a:t> Print (“&lt;blah&gt;”, count[</a:t>
+            </a:r>
+            <a:r>
+              <a:rPr lang="en-US" sz="2400" b="0" strike="noStrike" spc="-1" dirty="0" err="1">
+                <a:solidFill>
+                  <a:srgbClr val="000000"/>
+                </a:solidFill>
+                <a:latin typeface="Calibri"/>
+              </a:rPr>
+              <a:t>i,j</a:t>
+            </a:r>
+            <a:r>
+              <a:rPr lang="en-US" sz="2400" b="0" strike="noStrike" spc="-1" dirty="0">
+                <a:solidFill>
+                  <a:srgbClr val="000000"/>
+                </a:solidFill>
+                <a:latin typeface="Calibri"/>
+              </a:rPr>
+              <a:t>], “&lt;/blah&gt;”)</a:t>
+            </a:r>
+          </a:p>
+          <a:p>
+            <a:pPr marL="432000" indent="-324000">
+              <a:spcBef>
+                <a:spcPts val="1417"/>
+              </a:spcBef>
+              <a:buClr>
+                <a:srgbClr val="000000"/>
+              </a:buClr>
+              <a:buSzPct val="45000"/>
+              <a:buFont typeface="Wingdings" charset="2"/>
+              <a:buChar char=""/>
+            </a:pPr>
+            <a:r>
+              <a:rPr lang="en-US" sz="3200" b="0" i="1" strike="noStrike" spc="-1" dirty="0" smtClean="0">
+                <a:solidFill>
+                  <a:srgbClr val="000000"/>
+                </a:solidFill>
+                <a:latin typeface="Calibri"/>
+              </a:rPr>
+              <a:t>But</a:t>
+            </a:r>
+            <a:r>
+              <a:rPr lang="en-US" sz="3200" b="0" strike="noStrike" spc="-1" dirty="0" smtClean="0">
+                <a:solidFill>
+                  <a:srgbClr val="000000"/>
+                </a:solidFill>
+                <a:latin typeface="Calibri"/>
+              </a:rPr>
+              <a:t>: one </a:t>
+            </a:r>
+            <a:r>
+              <a:rPr lang="en-US" sz="3200" b="0" strike="noStrike" spc="-1" dirty="0">
+                <a:solidFill>
+                  <a:srgbClr val="000000"/>
+                </a:solidFill>
+                <a:latin typeface="Calibri"/>
+              </a:rPr>
+              <a:t>unified XSLT stage for the details</a:t>
+            </a:r>
+          </a:p>
+          <a:p>
+            <a:pPr marL="864000" lvl="1" indent="-324000">
+              <a:spcBef>
+                <a:spcPts val="1134"/>
+              </a:spcBef>
+              <a:buClr>
+                <a:srgbClr val="000000"/>
+              </a:buClr>
+              <a:buSzPct val="75000"/>
+              <a:buFont typeface="Symbol" charset="2"/>
+              <a:buChar char=""/>
+            </a:pPr>
+            <a:r>
+              <a:rPr lang="en-US" sz="2400" b="0" strike="noStrike" spc="-1" dirty="0">
+                <a:solidFill>
+                  <a:srgbClr val="000000"/>
+                </a:solidFill>
+                <a:latin typeface="Calibri"/>
+              </a:rPr>
+              <a:t>Easy to amend for future changes</a:t>
+            </a:r>
+          </a:p>
+          <a:p>
+            <a:pPr marL="864000" lvl="1" indent="-324000">
+              <a:spcBef>
+                <a:spcPts val="1134"/>
+              </a:spcBef>
+              <a:buClr>
+                <a:srgbClr val="000000"/>
+              </a:buClr>
+              <a:buSzPct val="75000"/>
+              <a:buFont typeface="Symbol" charset="2"/>
+              <a:buChar char=""/>
+            </a:pPr>
+            <a:r>
+              <a:rPr lang="en-US" sz="2400" b="0" strike="noStrike" spc="-1" dirty="0">
+                <a:solidFill>
+                  <a:srgbClr val="000000"/>
+                </a:solidFill>
+                <a:latin typeface="Calibri"/>
+              </a:rPr>
+              <a:t>Open-source code on GitHub for anyone to propose amendments</a:t>
+            </a:r>
+          </a:p>
+          <a:p>
+            <a:pPr marL="864000" lvl="1" indent="-324000">
+              <a:spcBef>
+                <a:spcPts val="1134"/>
+              </a:spcBef>
+              <a:buClr>
+                <a:srgbClr val="000000"/>
+              </a:buClr>
+              <a:buSzPct val="75000"/>
+              <a:buFont typeface="Symbol" charset="2"/>
+              <a:buChar char=""/>
+            </a:pPr>
+            <a:r>
+              <a:rPr lang="en-US" sz="2400" b="0" strike="noStrike" spc="-1" dirty="0">
+                <a:solidFill>
+                  <a:srgbClr val="000000"/>
+                </a:solidFill>
+                <a:latin typeface="Calibri"/>
+              </a:rPr>
+              <a:t>Leaves the statisticians to do statistics</a:t>
+            </a:r>
+          </a:p>
+          <a:p>
+            <a:pPr marL="864000" lvl="1" indent="-324000">
+              <a:spcBef>
+                <a:spcPts val="1134"/>
+              </a:spcBef>
+              <a:buClr>
+                <a:srgbClr val="000000"/>
+              </a:buClr>
+              <a:buSzPct val="75000"/>
+              <a:buFont typeface="Symbol" charset="2"/>
+              <a:buChar char=""/>
+            </a:pPr>
+            <a:r>
+              <a:rPr lang="en-US" sz="2400" b="0" strike="noStrike" spc="-1" dirty="0">
+                <a:solidFill>
+                  <a:srgbClr val="000000"/>
+                </a:solidFill>
+                <a:latin typeface="Calibri"/>
+              </a:rPr>
+              <a:t>Need to export into “Simple” XML from Stata</a:t>
             </a:r>
           </a:p>
         </p:txBody>
@@ -6554,9 +6599,6 @@
           <a:lstStyle/>
           <a:p>
             <a:pPr marL="343080" indent="-342720">
-              <a:lnSpc>
-                <a:spcPct val="100000"/>
-              </a:lnSpc>
               <a:spcBef>
                 <a:spcPts val="641"/>
               </a:spcBef>
@@ -6567,13 +6609,31 @@
               <a:buChar char="•"/>
             </a:pPr>
             <a:r>
-              <a:rPr lang="en-US" sz="3200" b="0" strike="noStrike" spc="-1">
+              <a:rPr lang="en-US" sz="3200" spc="-1" dirty="0">
                 <a:solidFill>
                   <a:srgbClr val="000000"/>
                 </a:solidFill>
                 <a:latin typeface="Calibri"/>
               </a:rPr>
-              <a:t>R code in a zip file with worked example</a:t>
+              <a:t>R Code -&gt; package via the </a:t>
+            </a:r>
+            <a:r>
+              <a:rPr lang="en-US" sz="3200" spc="-1" dirty="0" err="1">
+                <a:solidFill>
+                  <a:srgbClr val="000000"/>
+                </a:solidFill>
+                <a:latin typeface="Calibri"/>
+              </a:rPr>
+              <a:t>github</a:t>
+            </a:r>
+            <a:r>
+              <a:rPr lang="en-US" sz="3200" spc="-1" dirty="0">
+                <a:solidFill>
+                  <a:srgbClr val="000000"/>
+                </a:solidFill>
+                <a:latin typeface="Calibri"/>
+              </a:rPr>
+              <a:t> link</a:t>
             </a:r>
           </a:p>
           <a:p>
@@ -6591,13 +6651,22 @@
               <a:buChar char="•"/>
             </a:pPr>
             <a:r>
-              <a:rPr lang="en-US" sz="3200" b="0" strike="noStrike" spc="-1">
+              <a:rPr lang="en-US" sz="3200" b="0" strike="noStrike" spc="-1" dirty="0" smtClean="0">
                 <a:solidFill>
                   <a:srgbClr val="000000"/>
                 </a:solidFill>
                 <a:latin typeface="Calibri"/>
               </a:rPr>
-              <a:t>SAS code equivalent..</a:t>
+              <a:t>SAS </a:t>
+            </a:r>
+            <a:r>
+              <a:rPr lang="en-US" sz="3200" b="0" strike="noStrike" spc="-1" dirty="0">
+                <a:solidFill>
+                  <a:srgbClr val="000000"/>
+                </a:solidFill>
+                <a:latin typeface="Calibri"/>
+              </a:rPr>
+              <a:t>code equivalent..</a:t>
             </a:r>
           </a:p>
           <a:p>
@@ -6615,7 +6684,7 @@
               <a:buChar char="•"/>
             </a:pPr>
             <a:r>
-              <a:rPr lang="en-US" sz="3200" b="0" strike="noStrike" spc="-1">
+              <a:rPr lang="en-US" sz="3200" b="0" strike="noStrike" spc="-1" dirty="0">
                 <a:solidFill>
                   <a:srgbClr val="000000"/>
                 </a:solidFill>
@@ -6639,14 +6708,20 @@
               <a:buChar char="•"/>
             </a:pPr>
             <a:r>
-              <a:rPr lang="en-US" sz="3200" b="0" strike="noStrike" spc="-1">
+              <a:rPr lang="en-US" sz="3200" b="0" strike="noStrike" spc="-1" dirty="0" smtClean="0">
                 <a:solidFill>
                   <a:srgbClr val="000000"/>
                 </a:solidFill>
                 <a:latin typeface="Calibri"/>
               </a:rPr>
-              <a:t>R Code -&gt; package via the github link</a:t>
-            </a:r>
+              <a:t>Documentation</a:t>
+            </a:r>
+            <a:endParaRPr lang="en-US" sz="3200" b="0" strike="noStrike" spc="-1" dirty="0">
+              <a:solidFill>
+                <a:srgbClr val="000000"/>
+              </a:solidFill>
+              <a:latin typeface="Calibri"/>
+            </a:endParaRPr>
           </a:p>
           <a:p>
             <a:pPr marL="343080" indent="-342720">
@@ -6663,31 +6738,7 @@
               <a:buChar char="•"/>
             </a:pPr>
             <a:r>
-              <a:rPr lang="en-US" sz="3200" b="0" strike="noStrike" spc="-1">
-                <a:solidFill>
-                  <a:srgbClr val="000000"/>
-                </a:solidFill>
-                <a:latin typeface="Calibri"/>
-              </a:rPr>
-              <a:t>Documentation</a:t>
-            </a:r>
-          </a:p>
-          <a:p>
-            <a:pPr marL="343080" indent="-342720">
-              <a:lnSpc>
-                <a:spcPct val="100000"/>
-              </a:lnSpc>
-              <a:spcBef>
-                <a:spcPts val="641"/>
-              </a:spcBef>
-              <a:buClr>
-                <a:srgbClr val="000000"/>
-              </a:buClr>
-              <a:buFont typeface="Arial"/>
-              <a:buChar char="•"/>
-            </a:pPr>
-            <a:r>
-              <a:rPr lang="en-US" sz="3200" b="0" strike="noStrike" spc="-1">
+              <a:rPr lang="en-US" sz="3200" b="0" strike="noStrike" spc="-1" dirty="0">
                 <a:solidFill>
                   <a:srgbClr val="000000"/>
                 </a:solidFill>
@@ -7197,81 +7248,89 @@
       </p:grpSpPr>
       <p:sp>
         <p:nvSpPr>
-          <p:cNvPr id="179" name="TextShape 1"/>
-          <p:cNvSpPr txBox="1"/>
-          <p:nvPr/>
-        </p:nvSpPr>
-        <p:spPr>
-          <a:xfrm>
-            <a:off x="71280" y="866160"/>
-            <a:ext cx="8929440" cy="625320"/>
-          </a:xfrm>
-          <a:prstGeom prst="rect">
-            <a:avLst/>
-          </a:prstGeom>
-          <a:noFill/>
-          <a:ln>
-            <a:noFill/>
-          </a:ln>
-        </p:spPr>
-        <p:txBody>
-          <a:bodyPr lIns="0" tIns="0" rIns="0" bIns="0" anchor="ctr">
-            <a:spAutoFit/>
-          </a:bodyPr>
-          <a:lstStyle/>
-          <a:p>
-            <a:r>
-              <a:rPr lang="en-US" sz="4400" b="0" strike="noStrike" spc="-1">
-                <a:solidFill>
-                  <a:srgbClr val="000000"/>
-                </a:solidFill>
-                <a:latin typeface="Arial"/>
-              </a:rPr>
-              <a:t>Acknowledgments</a:t>
-            </a:r>
+          <p:cNvPr id="4" name="Text Placeholder 3"/>
+          <p:cNvSpPr>
+            <a:spLocks noGrp="1"/>
+          </p:cNvSpPr>
+          <p:nvPr>
+            <p:ph type="body"/>
+          </p:nvPr>
+        </p:nvSpPr>
+        <p:spPr/>
+        <p:txBody>
+          <a:bodyPr/>
+          <a:lstStyle/>
+          <a:p>
+            <a:r>
+              <a:rPr lang="en-GB" dirty="0" smtClean="0"/>
+              <a:t>Birmingham</a:t>
+            </a:r>
+          </a:p>
+          <a:p>
+            <a:r>
+              <a:rPr lang="en-GB" dirty="0" smtClean="0"/>
+              <a:t>Leeds</a:t>
+            </a:r>
+          </a:p>
+          <a:p>
+            <a:r>
+              <a:rPr lang="en-GB" dirty="0" smtClean="0"/>
+              <a:t>Glasgow</a:t>
+            </a:r>
+          </a:p>
+          <a:p>
+            <a:r>
+              <a:rPr lang="en-GB" dirty="0" smtClean="0"/>
+              <a:t>All who participated in the Survey and spec feedback</a:t>
+            </a:r>
+          </a:p>
+          <a:p>
+            <a:endParaRPr lang="en-GB" dirty="0"/>
+          </a:p>
+          <a:p>
+            <a:r>
+              <a:rPr lang="en-GB" dirty="0" smtClean="0"/>
+              <a:t>NIHR funding</a:t>
+            </a:r>
+          </a:p>
+          <a:p>
+            <a:endParaRPr lang="en-GB" dirty="0"/>
+          </a:p>
+        </p:txBody>
+      </p:sp>
+      <p:sp>
+        <p:nvSpPr>
+          <p:cNvPr id="2" name="Title 1"/>
+          <p:cNvSpPr>
+            <a:spLocks noGrp="1"/>
+          </p:cNvSpPr>
+          <p:nvPr>
+            <p:ph type="title"/>
+          </p:nvPr>
+        </p:nvSpPr>
+        <p:spPr/>
+        <p:txBody>
+          <a:bodyPr/>
+          <a:lstStyle/>
+          <a:p>
+            <a:r>
+              <a:rPr lang="en-GB" dirty="0" smtClean="0"/>
+              <a:t>Acknowledgements</a:t>
+            </a:r>
+            <a:endParaRPr lang="en-GB" dirty="0"/>
           </a:p>
         </p:txBody>
       </p:sp>
     </p:spTree>
+    <p:extLst>
+      <p:ext uri="{BB962C8B-B14F-4D97-AF65-F5344CB8AC3E}">
+        <p14:creationId xmlns:p14="http://schemas.microsoft.com/office/powerpoint/2010/main" val="3974125929"/>
+      </p:ext>
+    </p:extLst>
   </p:cSld>
   <p:clrMapOvr>
     <a:masterClrMapping/>
   </p:clrMapOvr>
-  <mc:AlternateContent xmlns:mc="http://schemas.openxmlformats.org/markup-compatibility/2006" xmlns:p14="http://schemas.microsoft.com/office/powerpoint/2010/main">
-    <mc:Choice Requires="p14">
-      <p:transition spd="slow" p14:dur="2000"/>
-    </mc:Choice>
-    <mc:Fallback xmlns:p15="http://schemas.microsoft.com/office/powerpoint/2012/main" xmlns="">
-      <p:transition spd="slow"/>
-    </mc:Fallback>
-  </mc:AlternateContent>
-  <p:timing>
-    <p:tnLst>
-      <p:par>
-        <p:cTn id="1" dur="indefinite" restart="never" nodeType="tmRoot">
-          <p:childTnLst>
-            <p:seq>
-              <p:cTn id="2" dur="indefinite" nodeType="mainSeq"/>
-              <p:prevCondLst>
-                <p:cond evt="onPrev" delay="0">
-                  <p:tgtEl>
-                    <p:sldTgt/>
-                  </p:tgtEl>
-                </p:cond>
-              </p:prevCondLst>
-              <p:nextCondLst>
-                <p:cond evt="onNext" delay="0">
-                  <p:tgtEl>
-                    <p:sldTgt/>
-                  </p:tgtEl>
-                </p:cond>
-              </p:nextCondLst>
-            </p:seq>
-          </p:childTnLst>
-        </p:cTn>
-      </p:par>
-    </p:tnLst>
-  </p:timing>
 </p:sld>
 </file>
 
@@ -7580,6 +7639,78 @@
 </file>
 
 <file path=ppt/slides/slide22.xml><?xml version="1.0" encoding="utf-8"?>
+<p:sld xmlns:a="http://schemas.openxmlformats.org/drawingml/2006/main" xmlns:r="http://schemas.openxmlformats.org/officeDocument/2006/relationships" xmlns:p="http://schemas.openxmlformats.org/presentationml/2006/main">
+  <p:cSld>
+    <p:spTree>
+      <p:nvGrpSpPr>
+        <p:cNvPr id="1" name=""/>
+        <p:cNvGrpSpPr/>
+        <p:nvPr/>
+      </p:nvGrpSpPr>
+      <p:grpSpPr>
+        <a:xfrm>
+          <a:off x="0" y="0"/>
+          <a:ext cx="0" cy="0"/>
+          <a:chOff x="0" y="0"/>
+          <a:chExt cx="0" cy="0"/>
+        </a:xfrm>
+      </p:grpSpPr>
+      <p:sp>
+        <p:nvSpPr>
+          <p:cNvPr id="2" name="Title 1"/>
+          <p:cNvSpPr>
+            <a:spLocks noGrp="1"/>
+          </p:cNvSpPr>
+          <p:nvPr>
+            <p:ph type="title"/>
+          </p:nvPr>
+        </p:nvSpPr>
+        <p:spPr/>
+        <p:txBody>
+          <a:bodyPr/>
+          <a:lstStyle/>
+          <a:p>
+            <a:r>
+              <a:rPr lang="en-GB" dirty="0" smtClean="0"/>
+              <a:t>Extra Slides</a:t>
+            </a:r>
+            <a:endParaRPr lang="en-GB" dirty="0"/>
+          </a:p>
+        </p:txBody>
+      </p:sp>
+      <p:sp>
+        <p:nvSpPr>
+          <p:cNvPr id="3" name="Subtitle 2"/>
+          <p:cNvSpPr>
+            <a:spLocks noGrp="1"/>
+          </p:cNvSpPr>
+          <p:nvPr>
+            <p:ph type="subTitle"/>
+          </p:nvPr>
+        </p:nvSpPr>
+        <p:spPr/>
+        <p:txBody>
+          <a:bodyPr/>
+          <a:lstStyle/>
+          <a:p>
+            <a:endParaRPr lang="en-GB" dirty="0"/>
+          </a:p>
+        </p:txBody>
+      </p:sp>
+    </p:spTree>
+    <p:extLst>
+      <p:ext uri="{BB962C8B-B14F-4D97-AF65-F5344CB8AC3E}">
+        <p14:creationId xmlns:p14="http://schemas.microsoft.com/office/powerpoint/2010/main" val="1035103460"/>
+      </p:ext>
+    </p:extLst>
+  </p:cSld>
+  <p:clrMapOvr>
+    <a:masterClrMapping/>
+  </p:clrMapOvr>
+</p:sld>
+</file>
+
+<file path=ppt/slides/slide23.xml><?xml version="1.0" encoding="utf-8"?>
 <p:sld xmlns:a="http://schemas.openxmlformats.org/drawingml/2006/main" xmlns:r="http://schemas.openxmlformats.org/officeDocument/2006/relationships" xmlns:p="http://schemas.openxmlformats.org/presentationml/2006/main">
   <p:cSld>
     <p:spTree>
@@ -8047,7 +8178,7 @@
         </p:spPr>
         <p:txBody>
           <a:bodyPr anchor="ctr">
-            <a:normAutofit fontScale="85000" lnSpcReduction="10000"/>
+            <a:normAutofit fontScale="92500" lnSpcReduction="20000"/>
           </a:bodyPr>
           <a:lstStyle/>
           <a:p>

</xml_diff>